<commit_message>
add: added pdf file
</commit_message>
<xml_diff>
--- a/retail-data-analysis.pptx
+++ b/retail-data-analysis.pptx
@@ -278,7 +278,7 @@
           <a:p>
             <a:fld id="{EF1077DB-935E-4A0A-947A-D283B9F9F452}" type="datetimeFigureOut">
               <a:rPr lang="en-US" smtClean="0"/>
-              <a:t>3/3/2024</a:t>
+              <a:t>3/9/2024</a:t>
             </a:fld>
             <a:endParaRPr lang="en-US" dirty="0"/>
           </a:p>
@@ -455,7 +455,7 @@
           <a:p>
             <a:fld id="{2D9EC30E-1A71-4188-9BE7-E2A64929A436}" type="datetimeFigureOut">
               <a:rPr lang="en-US" noProof="0" smtClean="0"/>
-              <a:t>3/3/2024</a:t>
+              <a:t>3/9/2024</a:t>
             </a:fld>
             <a:endParaRPr lang="en-US" noProof="0" dirty="0"/>
           </a:p>
@@ -1552,7 +1552,7 @@
             <a:fld id="{B61BEF0D-F0BB-DE4B-95CE-6DB70DBA9567}" type="datetimeFigureOut">
               <a:rPr lang="en-US" smtClean="0"/>
               <a:pPr/>
-              <a:t>3/3/2024</a:t>
+              <a:t>3/9/2024</a:t>
             </a:fld>
             <a:endParaRPr lang="en-US" dirty="0"/>
           </a:p>
@@ -1806,7 +1806,7 @@
             <a:fld id="{B61BEF0D-F0BB-DE4B-95CE-6DB70DBA9567}" type="datetimeFigureOut">
               <a:rPr lang="en-US" smtClean="0"/>
               <a:pPr/>
-              <a:t>3/3/2024</a:t>
+              <a:t>3/9/2024</a:t>
             </a:fld>
             <a:endParaRPr lang="en-US" dirty="0"/>
           </a:p>
@@ -2123,7 +2123,7 @@
             <a:fld id="{B61BEF0D-F0BB-DE4B-95CE-6DB70DBA9567}" type="datetimeFigureOut">
               <a:rPr lang="en-US" smtClean="0"/>
               <a:pPr/>
-              <a:t>3/3/2024</a:t>
+              <a:t>3/9/2024</a:t>
             </a:fld>
             <a:endParaRPr lang="en-US" dirty="0"/>
           </a:p>
@@ -2459,7 +2459,7 @@
             <a:fld id="{B61BEF0D-F0BB-DE4B-95CE-6DB70DBA9567}" type="datetimeFigureOut">
               <a:rPr lang="en-US" smtClean="0"/>
               <a:pPr/>
-              <a:t>3/3/2024</a:t>
+              <a:t>3/9/2024</a:t>
             </a:fld>
             <a:endParaRPr lang="en-US" dirty="0"/>
           </a:p>
@@ -2776,7 +2776,7 @@
             <a:fld id="{B61BEF0D-F0BB-DE4B-95CE-6DB70DBA9567}" type="datetimeFigureOut">
               <a:rPr lang="en-US" smtClean="0"/>
               <a:pPr/>
-              <a:t>3/3/2024</a:t>
+              <a:t>3/9/2024</a:t>
             </a:fld>
             <a:endParaRPr lang="en-US" dirty="0"/>
           </a:p>
@@ -3172,7 +3172,7 @@
             <a:fld id="{B61BEF0D-F0BB-DE4B-95CE-6DB70DBA9567}" type="datetimeFigureOut">
               <a:rPr lang="en-US" smtClean="0"/>
               <a:pPr/>
-              <a:t>3/3/2024</a:t>
+              <a:t>3/9/2024</a:t>
             </a:fld>
             <a:endParaRPr lang="en-US" dirty="0"/>
           </a:p>
@@ -3344,7 +3344,7 @@
           <a:p>
             <a:fld id="{55C6B4A9-1611-4792-9094-5F34BCA07E0B}" type="datetimeFigureOut">
               <a:rPr lang="en-US" smtClean="0"/>
-              <a:t>3/3/2024</a:t>
+              <a:t>3/9/2024</a:t>
             </a:fld>
             <a:endParaRPr lang="en-US" dirty="0"/>
           </a:p>
@@ -3526,7 +3526,7 @@
             <a:fld id="{B61BEF0D-F0BB-DE4B-95CE-6DB70DBA9567}" type="datetimeFigureOut">
               <a:rPr lang="en-US" smtClean="0"/>
               <a:pPr/>
-              <a:t>3/3/2024</a:t>
+              <a:t>3/9/2024</a:t>
             </a:fld>
             <a:endParaRPr lang="en-US" dirty="0"/>
           </a:p>
@@ -5255,7 +5255,7 @@
             <a:fld id="{B61BEF0D-F0BB-DE4B-95CE-6DB70DBA9567}" type="datetimeFigureOut">
               <a:rPr lang="en-US" smtClean="0"/>
               <a:pPr/>
-              <a:t>3/3/2024</a:t>
+              <a:t>3/9/2024</a:t>
             </a:fld>
             <a:endParaRPr lang="en-US" dirty="0"/>
           </a:p>
@@ -6990,7 +6990,7 @@
             <a:fld id="{B61BEF0D-F0BB-DE4B-95CE-6DB70DBA9567}" type="datetimeFigureOut">
               <a:rPr lang="en-US" smtClean="0"/>
               <a:pPr/>
-              <a:t>3/3/2024</a:t>
+              <a:t>3/9/2024</a:t>
             </a:fld>
             <a:endParaRPr lang="en-US" dirty="0"/>
           </a:p>
@@ -7224,7 +7224,7 @@
           <a:p>
             <a:fld id="{EB712588-04B1-427B-82EE-E8DB90309F08}" type="datetimeFigureOut">
               <a:rPr lang="en-US" smtClean="0"/>
-              <a:t>3/3/2024</a:t>
+              <a:t>3/9/2024</a:t>
             </a:fld>
             <a:endParaRPr lang="en-US" dirty="0"/>
           </a:p>
@@ -7600,7 +7600,7 @@
             <a:fld id="{B61BEF0D-F0BB-DE4B-95CE-6DB70DBA9567}" type="datetimeFigureOut">
               <a:rPr lang="en-US" smtClean="0"/>
               <a:pPr/>
-              <a:t>3/3/2024</a:t>
+              <a:t>3/9/2024</a:t>
             </a:fld>
             <a:endParaRPr lang="en-US" dirty="0"/>
           </a:p>
@@ -7726,7 +7726,7 @@
             <a:fld id="{B61BEF0D-F0BB-DE4B-95CE-6DB70DBA9567}" type="datetimeFigureOut">
               <a:rPr lang="en-US" smtClean="0"/>
               <a:pPr/>
-              <a:t>3/3/2024</a:t>
+              <a:t>3/9/2024</a:t>
             </a:fld>
             <a:endParaRPr lang="en-US" dirty="0"/>
           </a:p>
@@ -7824,7 +7824,7 @@
             <a:fld id="{B61BEF0D-F0BB-DE4B-95CE-6DB70DBA9567}" type="datetimeFigureOut">
               <a:rPr lang="en-US" smtClean="0"/>
               <a:pPr/>
-              <a:t>3/3/2024</a:t>
+              <a:t>3/9/2024</a:t>
             </a:fld>
             <a:endParaRPr lang="en-US" dirty="0"/>
           </a:p>
@@ -8081,7 +8081,7 @@
           <a:p>
             <a:fld id="{42A54C80-263E-416B-A8E0-580EDEADCBDC}" type="datetimeFigureOut">
               <a:rPr lang="en-US" smtClean="0"/>
-              <a:t>3/3/2024</a:t>
+              <a:t>3/9/2024</a:t>
             </a:fld>
             <a:endParaRPr lang="en-US" dirty="0"/>
           </a:p>
@@ -8389,7 +8389,7 @@
             <a:fld id="{B61BEF0D-F0BB-DE4B-95CE-6DB70DBA9567}" type="datetimeFigureOut">
               <a:rPr lang="en-US" smtClean="0"/>
               <a:pPr/>
-              <a:t>3/3/2024</a:t>
+              <a:t>3/9/2024</a:t>
             </a:fld>
             <a:endParaRPr lang="en-US" dirty="0"/>
           </a:p>
@@ -9093,7 +9093,7 @@
             <a:fld id="{B61BEF0D-F0BB-DE4B-95CE-6DB70DBA9567}" type="datetimeFigureOut">
               <a:rPr lang="en-US" smtClean="0"/>
               <a:pPr/>
-              <a:t>3/3/2024</a:t>
+              <a:t>3/9/2024</a:t>
             </a:fld>
             <a:endParaRPr lang="en-US" dirty="0"/>
           </a:p>
@@ -9304,7 +9304,7 @@
                 </a:solidFill>
               </a:rPr>
               <a:pPr/>
-              <a:t>3/3/2024</a:t>
+              <a:t>3/9/2024</a:t>
             </a:fld>
             <a:endParaRPr lang="en-US" sz="1100" dirty="0">
               <a:solidFill>
@@ -10085,7 +10085,7 @@
                   <a:schemeClr val="tx1"/>
                 </a:solidFill>
               </a:rPr>
-              <a:t>AICTE Internship Student Registration ID) : STU616311a1eeaaa1633882529 </a:t>
+              <a:t>AICTE Internship Student Registration ID) : *****************</a:t>
             </a:r>
             <a:endParaRPr lang="en-IN" b="0" dirty="0">
               <a:solidFill>
@@ -12779,41 +12779,6 @@
       </p:sp>
       <p:sp>
         <p:nvSpPr>
-          <p:cNvPr id="31" name="Text Placeholder 30">
-            <a:extLst>
-              <a:ext uri="{FF2B5EF4-FFF2-40B4-BE49-F238E27FC236}">
-                <a16:creationId xmlns:a16="http://schemas.microsoft.com/office/drawing/2014/main" id="{97AB1F14-3A1E-4057-A473-9975BA59F012}"/>
-              </a:ext>
-            </a:extLst>
-          </p:cNvPr>
-          <p:cNvSpPr>
-            <a:spLocks noGrp="1"/>
-          </p:cNvSpPr>
-          <p:nvPr>
-            <p:ph type="body" sz="quarter" idx="13"/>
-          </p:nvPr>
-        </p:nvSpPr>
-        <p:spPr>
-          <a:xfrm>
-            <a:off x="3727865" y="4641925"/>
-            <a:ext cx="2139695" cy="1108635"/>
-          </a:xfrm>
-        </p:spPr>
-        <p:txBody>
-          <a:bodyPr>
-            <a:normAutofit/>
-          </a:bodyPr>
-          <a:lstStyle/>
-          <a:p>
-            <a:r>
-              <a:rPr lang="en-US" dirty="0"/>
-              <a:t>.</a:t>
-            </a:r>
-          </a:p>
-        </p:txBody>
-      </p:sp>
-      <p:sp>
-        <p:nvSpPr>
           <p:cNvPr id="17" name="Text Placeholder 28">
             <a:extLst>
               <a:ext uri="{FF2B5EF4-FFF2-40B4-BE49-F238E27FC236}">
@@ -13833,265 +13798,6 @@
           </a:lstStyle>
           <a:p>
             <a:endParaRPr lang="en-GB" dirty="0"/>
-          </a:p>
-        </p:txBody>
-      </p:sp>
-      <p:sp>
-        <p:nvSpPr>
-          <p:cNvPr id="32" name="Text Placeholder 30">
-            <a:extLst>
-              <a:ext uri="{FF2B5EF4-FFF2-40B4-BE49-F238E27FC236}">
-                <a16:creationId xmlns:a16="http://schemas.microsoft.com/office/drawing/2014/main" id="{B993AB29-3A3A-4473-8AC8-86E859C97321}"/>
-              </a:ext>
-            </a:extLst>
-          </p:cNvPr>
-          <p:cNvSpPr txBox="1">
-            <a:spLocks/>
-          </p:cNvSpPr>
-          <p:nvPr/>
-        </p:nvSpPr>
-        <p:spPr>
-          <a:xfrm>
-            <a:off x="8591363" y="4641925"/>
-            <a:ext cx="2139695" cy="1108635"/>
-          </a:xfrm>
-          <a:prstGeom prst="rect">
-            <a:avLst/>
-          </a:prstGeom>
-        </p:spPr>
-        <p:txBody>
-          <a:bodyPr vert="horz" lIns="91440" tIns="45720" rIns="91440" bIns="45720" rtlCol="0">
-            <a:normAutofit/>
-          </a:bodyPr>
-          <a:lstStyle>
-            <a:lvl1pPr marL="0" indent="0" algn="ctr" defTabSz="457200" rtl="0" eaLnBrk="1" latinLnBrk="0" hangingPunct="1">
-              <a:spcBef>
-                <a:spcPts val="1000"/>
-              </a:spcBef>
-              <a:spcAft>
-                <a:spcPts val="0"/>
-              </a:spcAft>
-              <a:buClr>
-                <a:schemeClr val="accent1"/>
-              </a:buClr>
-              <a:buSzPct val="80000"/>
-              <a:buFont typeface="Wingdings 3" charset="2"/>
-              <a:buNone/>
-              <a:defRPr lang="en-US" sz="1600" kern="1200" dirty="0" smtClean="0">
-                <a:solidFill>
-                  <a:schemeClr val="tx1"/>
-                </a:solidFill>
-                <a:latin typeface="+mn-lt"/>
-                <a:ea typeface="+mn-ea"/>
-                <a:cs typeface="+mn-cs"/>
-              </a:defRPr>
-            </a:lvl1pPr>
-            <a:lvl2pPr marL="742950" indent="-285750" algn="l" defTabSz="457200" rtl="0" eaLnBrk="1" latinLnBrk="0" hangingPunct="1">
-              <a:spcBef>
-                <a:spcPts val="1000"/>
-              </a:spcBef>
-              <a:spcAft>
-                <a:spcPts val="0"/>
-              </a:spcAft>
-              <a:buClr>
-                <a:schemeClr val="accent1"/>
-              </a:buClr>
-              <a:buSzPct val="80000"/>
-              <a:buFont typeface="Wingdings 3" charset="2"/>
-              <a:buChar char=""/>
-              <a:defRPr sz="1600" kern="1200">
-                <a:solidFill>
-                  <a:schemeClr val="tx1">
-                    <a:lumMod val="75000"/>
-                    <a:lumOff val="25000"/>
-                  </a:schemeClr>
-                </a:solidFill>
-                <a:latin typeface="+mn-lt"/>
-                <a:ea typeface="+mn-ea"/>
-                <a:cs typeface="+mn-cs"/>
-              </a:defRPr>
-            </a:lvl2pPr>
-            <a:lvl3pPr marL="1143000" indent="-228600" algn="l" defTabSz="457200" rtl="0" eaLnBrk="1" latinLnBrk="0" hangingPunct="1">
-              <a:spcBef>
-                <a:spcPts val="1000"/>
-              </a:spcBef>
-              <a:spcAft>
-                <a:spcPts val="0"/>
-              </a:spcAft>
-              <a:buClr>
-                <a:schemeClr val="accent1"/>
-              </a:buClr>
-              <a:buSzPct val="80000"/>
-              <a:buFont typeface="Wingdings 3" charset="2"/>
-              <a:buChar char=""/>
-              <a:defRPr sz="1400" kern="1200">
-                <a:solidFill>
-                  <a:schemeClr val="tx1">
-                    <a:lumMod val="75000"/>
-                    <a:lumOff val="25000"/>
-                  </a:schemeClr>
-                </a:solidFill>
-                <a:latin typeface="+mn-lt"/>
-                <a:ea typeface="+mn-ea"/>
-                <a:cs typeface="+mn-cs"/>
-              </a:defRPr>
-            </a:lvl3pPr>
-            <a:lvl4pPr marL="1600200" indent="-228600" algn="l" defTabSz="457200" rtl="0" eaLnBrk="1" latinLnBrk="0" hangingPunct="1">
-              <a:spcBef>
-                <a:spcPts val="1000"/>
-              </a:spcBef>
-              <a:spcAft>
-                <a:spcPts val="0"/>
-              </a:spcAft>
-              <a:buClr>
-                <a:schemeClr val="accent1"/>
-              </a:buClr>
-              <a:buSzPct val="80000"/>
-              <a:buFont typeface="Wingdings 3" charset="2"/>
-              <a:buChar char=""/>
-              <a:defRPr sz="1200" kern="1200">
-                <a:solidFill>
-                  <a:schemeClr val="tx1">
-                    <a:lumMod val="75000"/>
-                    <a:lumOff val="25000"/>
-                  </a:schemeClr>
-                </a:solidFill>
-                <a:latin typeface="+mn-lt"/>
-                <a:ea typeface="+mn-ea"/>
-                <a:cs typeface="+mn-cs"/>
-              </a:defRPr>
-            </a:lvl4pPr>
-            <a:lvl5pPr marL="2057400" indent="-228600" algn="l" defTabSz="457200" rtl="0" eaLnBrk="1" latinLnBrk="0" hangingPunct="1">
-              <a:spcBef>
-                <a:spcPts val="1000"/>
-              </a:spcBef>
-              <a:spcAft>
-                <a:spcPts val="0"/>
-              </a:spcAft>
-              <a:buClr>
-                <a:schemeClr val="accent1"/>
-              </a:buClr>
-              <a:buSzPct val="80000"/>
-              <a:buFont typeface="Wingdings 3" charset="2"/>
-              <a:buChar char=""/>
-              <a:defRPr sz="1200" kern="1200">
-                <a:solidFill>
-                  <a:schemeClr val="tx1">
-                    <a:lumMod val="75000"/>
-                    <a:lumOff val="25000"/>
-                  </a:schemeClr>
-                </a:solidFill>
-                <a:latin typeface="+mn-lt"/>
-                <a:ea typeface="+mn-ea"/>
-                <a:cs typeface="+mn-cs"/>
-              </a:defRPr>
-            </a:lvl5pPr>
-            <a:lvl6pPr marL="2514600" indent="-228600" algn="l" defTabSz="457200" rtl="0" eaLnBrk="1" latinLnBrk="0" hangingPunct="1">
-              <a:spcBef>
-                <a:spcPts val="1000"/>
-              </a:spcBef>
-              <a:spcAft>
-                <a:spcPts val="0"/>
-              </a:spcAft>
-              <a:buClr>
-                <a:schemeClr val="accent1"/>
-              </a:buClr>
-              <a:buSzPct val="80000"/>
-              <a:buFont typeface="Wingdings 3" charset="2"/>
-              <a:buChar char=""/>
-              <a:defRPr sz="1200" kern="1200">
-                <a:solidFill>
-                  <a:schemeClr val="tx1">
-                    <a:lumMod val="75000"/>
-                    <a:lumOff val="25000"/>
-                  </a:schemeClr>
-                </a:solidFill>
-                <a:latin typeface="+mn-lt"/>
-                <a:ea typeface="+mn-ea"/>
-                <a:cs typeface="+mn-cs"/>
-              </a:defRPr>
-            </a:lvl6pPr>
-            <a:lvl7pPr marL="2971800" indent="-228600" algn="l" defTabSz="457200" rtl="0" eaLnBrk="1" latinLnBrk="0" hangingPunct="1">
-              <a:spcBef>
-                <a:spcPts val="1000"/>
-              </a:spcBef>
-              <a:spcAft>
-                <a:spcPts val="0"/>
-              </a:spcAft>
-              <a:buClr>
-                <a:schemeClr val="accent1"/>
-              </a:buClr>
-              <a:buSzPct val="80000"/>
-              <a:buFont typeface="Wingdings 3" charset="2"/>
-              <a:buChar char=""/>
-              <a:defRPr sz="1200" kern="1200">
-                <a:solidFill>
-                  <a:schemeClr val="tx1">
-                    <a:lumMod val="75000"/>
-                    <a:lumOff val="25000"/>
-                  </a:schemeClr>
-                </a:solidFill>
-                <a:latin typeface="+mn-lt"/>
-                <a:ea typeface="+mn-ea"/>
-                <a:cs typeface="+mn-cs"/>
-              </a:defRPr>
-            </a:lvl7pPr>
-            <a:lvl8pPr marL="3429000" indent="-228600" algn="l" defTabSz="457200" rtl="0" eaLnBrk="1" latinLnBrk="0" hangingPunct="1">
-              <a:spcBef>
-                <a:spcPts val="1000"/>
-              </a:spcBef>
-              <a:spcAft>
-                <a:spcPts val="0"/>
-              </a:spcAft>
-              <a:buClr>
-                <a:schemeClr val="accent1"/>
-              </a:buClr>
-              <a:buSzPct val="80000"/>
-              <a:buFont typeface="Wingdings 3" charset="2"/>
-              <a:buChar char=""/>
-              <a:defRPr sz="1200" kern="1200">
-                <a:solidFill>
-                  <a:schemeClr val="tx1">
-                    <a:lumMod val="75000"/>
-                    <a:lumOff val="25000"/>
-                  </a:schemeClr>
-                </a:solidFill>
-                <a:latin typeface="+mn-lt"/>
-                <a:ea typeface="+mn-ea"/>
-                <a:cs typeface="+mn-cs"/>
-              </a:defRPr>
-            </a:lvl8pPr>
-            <a:lvl9pPr marL="3886200" indent="-228600" algn="l" defTabSz="457200" rtl="0" eaLnBrk="1" latinLnBrk="0" hangingPunct="1">
-              <a:spcBef>
-                <a:spcPts val="1000"/>
-              </a:spcBef>
-              <a:spcAft>
-                <a:spcPts val="0"/>
-              </a:spcAft>
-              <a:buClr>
-                <a:schemeClr val="accent1"/>
-              </a:buClr>
-              <a:buSzPct val="80000"/>
-              <a:buFont typeface="Wingdings 3" charset="2"/>
-              <a:buChar char=""/>
-              <a:defRPr sz="1200" kern="1200">
-                <a:solidFill>
-                  <a:schemeClr val="tx1">
-                    <a:lumMod val="75000"/>
-                    <a:lumOff val="25000"/>
-                  </a:schemeClr>
-                </a:solidFill>
-                <a:latin typeface="+mn-lt"/>
-                <a:ea typeface="+mn-ea"/>
-                <a:cs typeface="+mn-cs"/>
-              </a:defRPr>
-            </a:lvl9pPr>
-          </a:lstStyle>
-          <a:p>
-            <a:r>
-              <a:rPr lang="en-GB" dirty="0"/>
-              <a:t>.</a:t>
-            </a:r>
           </a:p>
         </p:txBody>
       </p:sp>
@@ -14142,7 +13848,7 @@
         </p:nvSpPr>
         <p:spPr>
           <a:xfrm>
-            <a:off x="2975012" y="3962573"/>
+            <a:off x="3170321" y="2723220"/>
             <a:ext cx="4553251" cy="1506072"/>
           </a:xfrm>
         </p:spPr>
@@ -14326,15 +14032,10 @@
                             </p:stCondLst>
                             <p:childTnLst>
                               <p:par>
-                                <p:cTn id="12" presetID="12" presetClass="entr" presetSubtype="4" fill="hold" grpId="0" nodeType="clickEffect" nodePh="1">
+                                <p:cTn id="12" presetID="42" presetClass="entr" presetSubtype="0" fill="hold" grpId="0" nodeType="clickEffect">
                                   <p:stCondLst>
                                     <p:cond delay="0"/>
                                   </p:stCondLst>
-                                  <p:endCondLst>
-                                    <p:cond evt="begin" delay="0">
-                                      <p:tn val="12"/>
-                                    </p:cond>
-                                  </p:endCondLst>
                                   <p:childTnLst>
                                     <p:set>
                                       <p:cBhvr>
@@ -14344,7 +14045,11 @@
                                           </p:stCondLst>
                                         </p:cTn>
                                         <p:tgtEl>
-                                          <p:spTgt spid="17"/>
+                                          <p:spTgt spid="12">
+                                            <p:txEl>
+                                              <p:pRg st="0" end="0"/>
+                                            </p:txEl>
+                                          </p:spTgt>
                                         </p:tgtEl>
                                         <p:attrNameLst>
                                           <p:attrName>style.visibility</p:attrName>
@@ -14354,11 +14059,54 @@
                                         <p:strVal val="visible"/>
                                       </p:to>
                                     </p:set>
+                                    <p:animEffect transition="in" filter="fade">
+                                      <p:cBhvr>
+                                        <p:cTn id="14" dur="1000"/>
+                                        <p:tgtEl>
+                                          <p:spTgt spid="12">
+                                            <p:txEl>
+                                              <p:pRg st="0" end="0"/>
+                                            </p:txEl>
+                                          </p:spTgt>
+                                        </p:tgtEl>
+                                      </p:cBhvr>
+                                    </p:animEffect>
                                     <p:anim calcmode="lin" valueType="num">
-                                      <p:cBhvr additive="base">
-                                        <p:cTn id="14" dur="500"/>
-                                        <p:tgtEl>
-                                          <p:spTgt spid="17"/>
+                                      <p:cBhvr>
+                                        <p:cTn id="15" dur="1000" fill="hold"/>
+                                        <p:tgtEl>
+                                          <p:spTgt spid="12">
+                                            <p:txEl>
+                                              <p:pRg st="0" end="0"/>
+                                            </p:txEl>
+                                          </p:spTgt>
+                                        </p:tgtEl>
+                                        <p:attrNameLst>
+                                          <p:attrName>ppt_x</p:attrName>
+                                        </p:attrNameLst>
+                                      </p:cBhvr>
+                                      <p:tavLst>
+                                        <p:tav tm="0">
+                                          <p:val>
+                                            <p:strVal val="#ppt_x"/>
+                                          </p:val>
+                                        </p:tav>
+                                        <p:tav tm="100000">
+                                          <p:val>
+                                            <p:strVal val="#ppt_x"/>
+                                          </p:val>
+                                        </p:tav>
+                                      </p:tavLst>
+                                    </p:anim>
+                                    <p:anim calcmode="lin" valueType="num">
+                                      <p:cBhvr>
+                                        <p:cTn id="16" dur="1000" fill="hold"/>
+                                        <p:tgtEl>
+                                          <p:spTgt spid="12">
+                                            <p:txEl>
+                                              <p:pRg st="0" end="0"/>
+                                            </p:txEl>
+                                          </p:spTgt>
                                         </p:tgtEl>
                                         <p:attrNameLst>
                                           <p:attrName>ppt_y</p:attrName>
@@ -14367,7 +14115,7 @@
                                       <p:tavLst>
                                         <p:tav tm="0">
                                           <p:val>
-                                            <p:strVal val="#ppt_y+#ppt_h*1.125000"/>
+                                            <p:strVal val="#ppt_y+.1"/>
                                           </p:val>
                                         </p:tav>
                                         <p:tav tm="100000">
@@ -14377,14 +14125,6 @@
                                         </p:tav>
                                       </p:tavLst>
                                     </p:anim>
-                                    <p:animEffect transition="in" filter="wipe(up)">
-                                      <p:cBhvr>
-                                        <p:cTn id="15" dur="500"/>
-                                        <p:tgtEl>
-                                          <p:spTgt spid="17"/>
-                                        </p:tgtEl>
-                                      </p:cBhvr>
-                                    </p:animEffect>
                                   </p:childTnLst>
                                 </p:cTn>
                               </p:par>
@@ -14395,34 +14135,34 @@
                     </p:cTn>
                   </p:par>
                   <p:par>
-                    <p:cTn id="16" fill="hold">
+                    <p:cTn id="17" fill="hold">
                       <p:stCondLst>
                         <p:cond delay="indefinite"/>
                       </p:stCondLst>
                       <p:childTnLst>
                         <p:par>
-                          <p:cTn id="17" fill="hold">
+                          <p:cTn id="18" fill="hold">
                             <p:stCondLst>
                               <p:cond delay="0"/>
                             </p:stCondLst>
                             <p:childTnLst>
                               <p:par>
-                                <p:cTn id="18" presetID="12" presetClass="entr" presetSubtype="4" fill="hold" grpId="0" nodeType="clickEffect">
+                                <p:cTn id="19" presetID="42" presetClass="entr" presetSubtype="0" fill="hold" grpId="0" nodeType="clickEffect">
                                   <p:stCondLst>
                                     <p:cond delay="0"/>
                                   </p:stCondLst>
                                   <p:childTnLst>
                                     <p:set>
                                       <p:cBhvr>
-                                        <p:cTn id="19" dur="1" fill="hold">
+                                        <p:cTn id="20" dur="1" fill="hold">
                                           <p:stCondLst>
                                             <p:cond delay="0"/>
                                           </p:stCondLst>
                                         </p:cTn>
                                         <p:tgtEl>
-                                          <p:spTgt spid="31">
+                                          <p:spTgt spid="12">
                                             <p:txEl>
-                                              <p:pRg st="0" end="0"/>
+                                              <p:pRg st="1" end="1"/>
                                             </p:txEl>
                                           </p:spTgt>
                                         </p:tgtEl>
@@ -14434,13 +14174,52 @@
                                         <p:strVal val="visible"/>
                                       </p:to>
                                     </p:set>
+                                    <p:animEffect transition="in" filter="fade">
+                                      <p:cBhvr>
+                                        <p:cTn id="21" dur="1000"/>
+                                        <p:tgtEl>
+                                          <p:spTgt spid="12">
+                                            <p:txEl>
+                                              <p:pRg st="1" end="1"/>
+                                            </p:txEl>
+                                          </p:spTgt>
+                                        </p:tgtEl>
+                                      </p:cBhvr>
+                                    </p:animEffect>
                                     <p:anim calcmode="lin" valueType="num">
-                                      <p:cBhvr additive="base">
-                                        <p:cTn id="20" dur="500"/>
-                                        <p:tgtEl>
-                                          <p:spTgt spid="31">
+                                      <p:cBhvr>
+                                        <p:cTn id="22" dur="1000" fill="hold"/>
+                                        <p:tgtEl>
+                                          <p:spTgt spid="12">
                                             <p:txEl>
-                                              <p:pRg st="0" end="0"/>
+                                              <p:pRg st="1" end="1"/>
+                                            </p:txEl>
+                                          </p:spTgt>
+                                        </p:tgtEl>
+                                        <p:attrNameLst>
+                                          <p:attrName>ppt_x</p:attrName>
+                                        </p:attrNameLst>
+                                      </p:cBhvr>
+                                      <p:tavLst>
+                                        <p:tav tm="0">
+                                          <p:val>
+                                            <p:strVal val="#ppt_x"/>
+                                          </p:val>
+                                        </p:tav>
+                                        <p:tav tm="100000">
+                                          <p:val>
+                                            <p:strVal val="#ppt_x"/>
+                                          </p:val>
+                                        </p:tav>
+                                      </p:tavLst>
+                                    </p:anim>
+                                    <p:anim calcmode="lin" valueType="num">
+                                      <p:cBhvr>
+                                        <p:cTn id="23" dur="1000" fill="hold"/>
+                                        <p:tgtEl>
+                                          <p:spTgt spid="12">
+                                            <p:txEl>
+                                              <p:pRg st="1" end="1"/>
                                             </p:txEl>
                                           </p:spTgt>
                                         </p:tgtEl>
@@ -14451,7 +14230,7 @@
                                       <p:tavLst>
                                         <p:tav tm="0">
                                           <p:val>
-                                            <p:strVal val="#ppt_y+#ppt_h*1.125000"/>
+                                            <p:strVal val="#ppt_y+.1"/>
                                           </p:val>
                                         </p:tav>
                                         <p:tav tm="100000">
@@ -14461,18 +14240,6 @@
                                         </p:tav>
                                       </p:tavLst>
                                     </p:anim>
-                                    <p:animEffect transition="in" filter="wipe(up)">
-                                      <p:cBhvr>
-                                        <p:cTn id="21" dur="500"/>
-                                        <p:tgtEl>
-                                          <p:spTgt spid="31">
-                                            <p:txEl>
-                                              <p:pRg st="0" end="0"/>
-                                            </p:txEl>
-                                          </p:spTgt>
-                                        </p:tgtEl>
-                                      </p:cBhvr>
-                                    </p:animEffect>
                                   </p:childTnLst>
                                 </p:cTn>
                               </p:par>
@@ -14483,275 +14250,36 @@
                     </p:cTn>
                   </p:par>
                   <p:par>
-                    <p:cTn id="22" fill="hold">
+                    <p:cTn id="24" fill="hold">
                       <p:stCondLst>
                         <p:cond delay="indefinite"/>
                       </p:stCondLst>
                       <p:childTnLst>
                         <p:par>
-                          <p:cTn id="23" fill="hold">
+                          <p:cTn id="25" fill="hold">
                             <p:stCondLst>
                               <p:cond delay="0"/>
                             </p:stCondLst>
                             <p:childTnLst>
                               <p:par>
-                                <p:cTn id="24" presetID="12" presetClass="entr" presetSubtype="4" fill="hold" grpId="0" nodeType="clickEffect" nodePh="1">
-                                  <p:stCondLst>
-                                    <p:cond delay="0"/>
-                                  </p:stCondLst>
-                                  <p:endCondLst>
-                                    <p:cond evt="begin" delay="0">
-                                      <p:tn val="24"/>
-                                    </p:cond>
-                                  </p:endCondLst>
-                                  <p:childTnLst>
-                                    <p:set>
-                                      <p:cBhvr>
-                                        <p:cTn id="25" dur="1" fill="hold">
-                                          <p:stCondLst>
-                                            <p:cond delay="0"/>
-                                          </p:stCondLst>
-                                        </p:cTn>
-                                        <p:tgtEl>
-                                          <p:spTgt spid="20"/>
-                                        </p:tgtEl>
-                                        <p:attrNameLst>
-                                          <p:attrName>style.visibility</p:attrName>
-                                        </p:attrNameLst>
-                                      </p:cBhvr>
-                                      <p:to>
-                                        <p:strVal val="visible"/>
-                                      </p:to>
-                                    </p:set>
-                                    <p:anim calcmode="lin" valueType="num">
-                                      <p:cBhvr additive="base">
-                                        <p:cTn id="26" dur="500"/>
-                                        <p:tgtEl>
-                                          <p:spTgt spid="20"/>
-                                        </p:tgtEl>
-                                        <p:attrNameLst>
-                                          <p:attrName>ppt_y</p:attrName>
-                                        </p:attrNameLst>
-                                      </p:cBhvr>
-                                      <p:tavLst>
-                                        <p:tav tm="0">
-                                          <p:val>
-                                            <p:strVal val="#ppt_y+#ppt_h*1.125000"/>
-                                          </p:val>
-                                        </p:tav>
-                                        <p:tav tm="100000">
-                                          <p:val>
-                                            <p:strVal val="#ppt_y"/>
-                                          </p:val>
-                                        </p:tav>
-                                      </p:tavLst>
-                                    </p:anim>
-                                    <p:animEffect transition="in" filter="wipe(up)">
-                                      <p:cBhvr>
-                                        <p:cTn id="27" dur="500"/>
-                                        <p:tgtEl>
-                                          <p:spTgt spid="20"/>
-                                        </p:tgtEl>
-                                      </p:cBhvr>
-                                    </p:animEffect>
-                                  </p:childTnLst>
-                                </p:cTn>
-                              </p:par>
-                            </p:childTnLst>
-                          </p:cTn>
-                        </p:par>
-                      </p:childTnLst>
-                    </p:cTn>
-                  </p:par>
-                  <p:par>
-                    <p:cTn id="28" fill="hold">
-                      <p:stCondLst>
-                        <p:cond delay="indefinite"/>
-                      </p:stCondLst>
-                      <p:childTnLst>
-                        <p:par>
-                          <p:cTn id="29" fill="hold">
-                            <p:stCondLst>
-                              <p:cond delay="0"/>
-                            </p:stCondLst>
-                            <p:childTnLst>
-                              <p:par>
-                                <p:cTn id="30" presetID="12" presetClass="entr" presetSubtype="4" fill="hold" grpId="0" nodeType="clickEffect" nodePh="1">
-                                  <p:stCondLst>
-                                    <p:cond delay="0"/>
-                                  </p:stCondLst>
-                                  <p:endCondLst>
-                                    <p:cond evt="begin" delay="0">
-                                      <p:tn val="30"/>
-                                    </p:cond>
-                                  </p:endCondLst>
-                                  <p:childTnLst>
-                                    <p:set>
-                                      <p:cBhvr>
-                                        <p:cTn id="31" dur="1" fill="hold">
-                                          <p:stCondLst>
-                                            <p:cond delay="0"/>
-                                          </p:stCondLst>
-                                        </p:cTn>
-                                        <p:tgtEl>
-                                          <p:spTgt spid="30"/>
-                                        </p:tgtEl>
-                                        <p:attrNameLst>
-                                          <p:attrName>style.visibility</p:attrName>
-                                        </p:attrNameLst>
-                                      </p:cBhvr>
-                                      <p:to>
-                                        <p:strVal val="visible"/>
-                                      </p:to>
-                                    </p:set>
-                                    <p:anim calcmode="lin" valueType="num">
-                                      <p:cBhvr additive="base">
-                                        <p:cTn id="32" dur="500"/>
-                                        <p:tgtEl>
-                                          <p:spTgt spid="30"/>
-                                        </p:tgtEl>
-                                        <p:attrNameLst>
-                                          <p:attrName>ppt_y</p:attrName>
-                                        </p:attrNameLst>
-                                      </p:cBhvr>
-                                      <p:tavLst>
-                                        <p:tav tm="0">
-                                          <p:val>
-                                            <p:strVal val="#ppt_y+#ppt_h*1.125000"/>
-                                          </p:val>
-                                        </p:tav>
-                                        <p:tav tm="100000">
-                                          <p:val>
-                                            <p:strVal val="#ppt_y"/>
-                                          </p:val>
-                                        </p:tav>
-                                      </p:tavLst>
-                                    </p:anim>
-                                    <p:animEffect transition="in" filter="wipe(up)">
-                                      <p:cBhvr>
-                                        <p:cTn id="33" dur="500"/>
-                                        <p:tgtEl>
-                                          <p:spTgt spid="30"/>
-                                        </p:tgtEl>
-                                      </p:cBhvr>
-                                    </p:animEffect>
-                                  </p:childTnLst>
-                                </p:cTn>
-                              </p:par>
-                            </p:childTnLst>
-                          </p:cTn>
-                        </p:par>
-                      </p:childTnLst>
-                    </p:cTn>
-                  </p:par>
-                  <p:par>
-                    <p:cTn id="34" fill="hold">
-                      <p:stCondLst>
-                        <p:cond delay="indefinite"/>
-                      </p:stCondLst>
-                      <p:childTnLst>
-                        <p:par>
-                          <p:cTn id="35" fill="hold">
-                            <p:stCondLst>
-                              <p:cond delay="0"/>
-                            </p:stCondLst>
-                            <p:childTnLst>
-                              <p:par>
-                                <p:cTn id="36" presetID="12" presetClass="entr" presetSubtype="4" fill="hold" grpId="0" nodeType="clickEffect" nodePh="1">
-                                  <p:stCondLst>
-                                    <p:cond delay="0"/>
-                                  </p:stCondLst>
-                                  <p:endCondLst>
-                                    <p:cond evt="begin" delay="0">
-                                      <p:tn val="36"/>
-                                    </p:cond>
-                                  </p:endCondLst>
-                                  <p:childTnLst>
-                                    <p:set>
-                                      <p:cBhvr>
-                                        <p:cTn id="37" dur="1" fill="hold">
-                                          <p:stCondLst>
-                                            <p:cond delay="0"/>
-                                          </p:stCondLst>
-                                        </p:cTn>
-                                        <p:tgtEl>
-                                          <p:spTgt spid="23"/>
-                                        </p:tgtEl>
-                                        <p:attrNameLst>
-                                          <p:attrName>style.visibility</p:attrName>
-                                        </p:attrNameLst>
-                                      </p:cBhvr>
-                                      <p:to>
-                                        <p:strVal val="visible"/>
-                                      </p:to>
-                                    </p:set>
-                                    <p:anim calcmode="lin" valueType="num">
-                                      <p:cBhvr additive="base">
-                                        <p:cTn id="38" dur="500"/>
-                                        <p:tgtEl>
-                                          <p:spTgt spid="23"/>
-                                        </p:tgtEl>
-                                        <p:attrNameLst>
-                                          <p:attrName>ppt_y</p:attrName>
-                                        </p:attrNameLst>
-                                      </p:cBhvr>
-                                      <p:tavLst>
-                                        <p:tav tm="0">
-                                          <p:val>
-                                            <p:strVal val="#ppt_y+#ppt_h*1.125000"/>
-                                          </p:val>
-                                        </p:tav>
-                                        <p:tav tm="100000">
-                                          <p:val>
-                                            <p:strVal val="#ppt_y"/>
-                                          </p:val>
-                                        </p:tav>
-                                      </p:tavLst>
-                                    </p:anim>
-                                    <p:animEffect transition="in" filter="wipe(up)">
-                                      <p:cBhvr>
-                                        <p:cTn id="39" dur="500"/>
-                                        <p:tgtEl>
-                                          <p:spTgt spid="23"/>
-                                        </p:tgtEl>
-                                      </p:cBhvr>
-                                    </p:animEffect>
-                                  </p:childTnLst>
-                                </p:cTn>
-                              </p:par>
-                            </p:childTnLst>
-                          </p:cTn>
-                        </p:par>
-                      </p:childTnLst>
-                    </p:cTn>
-                  </p:par>
-                  <p:par>
-                    <p:cTn id="40" fill="hold">
-                      <p:stCondLst>
-                        <p:cond delay="indefinite"/>
-                      </p:stCondLst>
-                      <p:childTnLst>
-                        <p:par>
-                          <p:cTn id="41" fill="hold">
-                            <p:stCondLst>
-                              <p:cond delay="0"/>
-                            </p:stCondLst>
-                            <p:childTnLst>
-                              <p:par>
-                                <p:cTn id="42" presetID="12" presetClass="entr" presetSubtype="4" fill="hold" grpId="0" nodeType="clickEffect">
+                                <p:cTn id="26" presetID="42" presetClass="entr" presetSubtype="0" fill="hold" grpId="0" nodeType="clickEffect">
                                   <p:stCondLst>
                                     <p:cond delay="0"/>
                                   </p:stCondLst>
                                   <p:childTnLst>
                                     <p:set>
                                       <p:cBhvr>
-                                        <p:cTn id="43" dur="1" fill="hold">
+                                        <p:cTn id="27" dur="1" fill="hold">
                                           <p:stCondLst>
                                             <p:cond delay="0"/>
                                           </p:stCondLst>
                                         </p:cTn>
                                         <p:tgtEl>
-                                          <p:spTgt spid="32"/>
+                                          <p:spTgt spid="12">
+                                            <p:txEl>
+                                              <p:pRg st="2" end="2"/>
+                                            </p:txEl>
+                                          </p:spTgt>
                                         </p:tgtEl>
                                         <p:attrNameLst>
                                           <p:attrName>style.visibility</p:attrName>
@@ -14761,11 +14289,54 @@
                                         <p:strVal val="visible"/>
                                       </p:to>
                                     </p:set>
+                                    <p:animEffect transition="in" filter="fade">
+                                      <p:cBhvr>
+                                        <p:cTn id="28" dur="1000"/>
+                                        <p:tgtEl>
+                                          <p:spTgt spid="12">
+                                            <p:txEl>
+                                              <p:pRg st="2" end="2"/>
+                                            </p:txEl>
+                                          </p:spTgt>
+                                        </p:tgtEl>
+                                      </p:cBhvr>
+                                    </p:animEffect>
                                     <p:anim calcmode="lin" valueType="num">
-                                      <p:cBhvr additive="base">
-                                        <p:cTn id="44" dur="500"/>
-                                        <p:tgtEl>
-                                          <p:spTgt spid="32"/>
+                                      <p:cBhvr>
+                                        <p:cTn id="29" dur="1000" fill="hold"/>
+                                        <p:tgtEl>
+                                          <p:spTgt spid="12">
+                                            <p:txEl>
+                                              <p:pRg st="2" end="2"/>
+                                            </p:txEl>
+                                          </p:spTgt>
+                                        </p:tgtEl>
+                                        <p:attrNameLst>
+                                          <p:attrName>ppt_x</p:attrName>
+                                        </p:attrNameLst>
+                                      </p:cBhvr>
+                                      <p:tavLst>
+                                        <p:tav tm="0">
+                                          <p:val>
+                                            <p:strVal val="#ppt_x"/>
+                                          </p:val>
+                                        </p:tav>
+                                        <p:tav tm="100000">
+                                          <p:val>
+                                            <p:strVal val="#ppt_x"/>
+                                          </p:val>
+                                        </p:tav>
+                                      </p:tavLst>
+                                    </p:anim>
+                                    <p:anim calcmode="lin" valueType="num">
+                                      <p:cBhvr>
+                                        <p:cTn id="30" dur="1000" fill="hold"/>
+                                        <p:tgtEl>
+                                          <p:spTgt spid="12">
+                                            <p:txEl>
+                                              <p:pRg st="2" end="2"/>
+                                            </p:txEl>
+                                          </p:spTgt>
                                         </p:tgtEl>
                                         <p:attrNameLst>
                                           <p:attrName>ppt_y</p:attrName>
@@ -14774,7 +14345,7 @@
                                       <p:tavLst>
                                         <p:tav tm="0">
                                           <p:val>
-                                            <p:strVal val="#ppt_y+#ppt_h*1.125000"/>
+                                            <p:strVal val="#ppt_y+.1"/>
                                           </p:val>
                                         </p:tav>
                                         <p:tav tm="100000">
@@ -14784,14 +14355,6 @@
                                         </p:tav>
                                       </p:tavLst>
                                     </p:anim>
-                                    <p:animEffect transition="in" filter="wipe(up)">
-                                      <p:cBhvr>
-                                        <p:cTn id="45" dur="500"/>
-                                        <p:tgtEl>
-                                          <p:spTgt spid="32"/>
-                                        </p:tgtEl>
-                                      </p:cBhvr>
-                                    </p:animEffect>
                                   </p:childTnLst>
                                 </p:cTn>
                               </p:par>
@@ -14824,12 +14387,7 @@
     </p:tnLst>
     <p:bldLst>
       <p:bldP spid="3" grpId="0"/>
-      <p:bldP spid="31" grpId="0" build="p"/>
-      <p:bldP spid="17" grpId="0"/>
-      <p:bldP spid="20" grpId="0"/>
-      <p:bldP spid="23" grpId="0"/>
-      <p:bldP spid="30" grpId="0"/>
-      <p:bldP spid="32" grpId="0"/>
+      <p:bldP spid="12" grpId="0" uiExpand="1" build="p"/>
     </p:bldLst>
   </p:timing>
 </p:sld>
@@ -18082,6 +17640,236 @@
                                           <p:spTgt spid="2">
                                             <p:txEl>
                                               <p:pRg st="2" end="2"/>
+                                            </p:txEl>
+                                          </p:spTgt>
+                                        </p:tgtEl>
+                                        <p:attrNameLst>
+                                          <p:attrName>ppt_y</p:attrName>
+                                        </p:attrNameLst>
+                                      </p:cBhvr>
+                                      <p:tavLst>
+                                        <p:tav tm="0">
+                                          <p:val>
+                                            <p:strVal val="#ppt_y+.1"/>
+                                          </p:val>
+                                        </p:tav>
+                                        <p:tav tm="100000">
+                                          <p:val>
+                                            <p:strVal val="#ppt_y"/>
+                                          </p:val>
+                                        </p:tav>
+                                      </p:tavLst>
+                                    </p:anim>
+                                  </p:childTnLst>
+                                </p:cTn>
+                              </p:par>
+                            </p:childTnLst>
+                          </p:cTn>
+                        </p:par>
+                      </p:childTnLst>
+                    </p:cTn>
+                  </p:par>
+                  <p:par>
+                    <p:cTn id="31" fill="hold">
+                      <p:stCondLst>
+                        <p:cond delay="indefinite"/>
+                      </p:stCondLst>
+                      <p:childTnLst>
+                        <p:par>
+                          <p:cTn id="32" fill="hold">
+                            <p:stCondLst>
+                              <p:cond delay="0"/>
+                            </p:stCondLst>
+                            <p:childTnLst>
+                              <p:par>
+                                <p:cTn id="33" presetID="42" presetClass="entr" presetSubtype="0" fill="hold" nodeType="clickEffect">
+                                  <p:stCondLst>
+                                    <p:cond delay="0"/>
+                                  </p:stCondLst>
+                                  <p:childTnLst>
+                                    <p:set>
+                                      <p:cBhvr>
+                                        <p:cTn id="34" dur="1" fill="hold">
+                                          <p:stCondLst>
+                                            <p:cond delay="0"/>
+                                          </p:stCondLst>
+                                        </p:cTn>
+                                        <p:tgtEl>
+                                          <p:spTgt spid="2">
+                                            <p:txEl>
+                                              <p:pRg st="3" end="3"/>
+                                            </p:txEl>
+                                          </p:spTgt>
+                                        </p:tgtEl>
+                                        <p:attrNameLst>
+                                          <p:attrName>style.visibility</p:attrName>
+                                        </p:attrNameLst>
+                                      </p:cBhvr>
+                                      <p:to>
+                                        <p:strVal val="visible"/>
+                                      </p:to>
+                                    </p:set>
+                                    <p:animEffect transition="in" filter="fade">
+                                      <p:cBhvr>
+                                        <p:cTn id="35" dur="1000"/>
+                                        <p:tgtEl>
+                                          <p:spTgt spid="2">
+                                            <p:txEl>
+                                              <p:pRg st="3" end="3"/>
+                                            </p:txEl>
+                                          </p:spTgt>
+                                        </p:tgtEl>
+                                      </p:cBhvr>
+                                    </p:animEffect>
+                                    <p:anim calcmode="lin" valueType="num">
+                                      <p:cBhvr>
+                                        <p:cTn id="36" dur="1000" fill="hold"/>
+                                        <p:tgtEl>
+                                          <p:spTgt spid="2">
+                                            <p:txEl>
+                                              <p:pRg st="3" end="3"/>
+                                            </p:txEl>
+                                          </p:spTgt>
+                                        </p:tgtEl>
+                                        <p:attrNameLst>
+                                          <p:attrName>ppt_x</p:attrName>
+                                        </p:attrNameLst>
+                                      </p:cBhvr>
+                                      <p:tavLst>
+                                        <p:tav tm="0">
+                                          <p:val>
+                                            <p:strVal val="#ppt_x"/>
+                                          </p:val>
+                                        </p:tav>
+                                        <p:tav tm="100000">
+                                          <p:val>
+                                            <p:strVal val="#ppt_x"/>
+                                          </p:val>
+                                        </p:tav>
+                                      </p:tavLst>
+                                    </p:anim>
+                                    <p:anim calcmode="lin" valueType="num">
+                                      <p:cBhvr>
+                                        <p:cTn id="37" dur="1000" fill="hold"/>
+                                        <p:tgtEl>
+                                          <p:spTgt spid="2">
+                                            <p:txEl>
+                                              <p:pRg st="3" end="3"/>
+                                            </p:txEl>
+                                          </p:spTgt>
+                                        </p:tgtEl>
+                                        <p:attrNameLst>
+                                          <p:attrName>ppt_y</p:attrName>
+                                        </p:attrNameLst>
+                                      </p:cBhvr>
+                                      <p:tavLst>
+                                        <p:tav tm="0">
+                                          <p:val>
+                                            <p:strVal val="#ppt_y+.1"/>
+                                          </p:val>
+                                        </p:tav>
+                                        <p:tav tm="100000">
+                                          <p:val>
+                                            <p:strVal val="#ppt_y"/>
+                                          </p:val>
+                                        </p:tav>
+                                      </p:tavLst>
+                                    </p:anim>
+                                  </p:childTnLst>
+                                </p:cTn>
+                              </p:par>
+                            </p:childTnLst>
+                          </p:cTn>
+                        </p:par>
+                      </p:childTnLst>
+                    </p:cTn>
+                  </p:par>
+                  <p:par>
+                    <p:cTn id="38" fill="hold">
+                      <p:stCondLst>
+                        <p:cond delay="indefinite"/>
+                      </p:stCondLst>
+                      <p:childTnLst>
+                        <p:par>
+                          <p:cTn id="39" fill="hold">
+                            <p:stCondLst>
+                              <p:cond delay="0"/>
+                            </p:stCondLst>
+                            <p:childTnLst>
+                              <p:par>
+                                <p:cTn id="40" presetID="42" presetClass="entr" presetSubtype="0" fill="hold" nodeType="clickEffect">
+                                  <p:stCondLst>
+                                    <p:cond delay="0"/>
+                                  </p:stCondLst>
+                                  <p:childTnLst>
+                                    <p:set>
+                                      <p:cBhvr>
+                                        <p:cTn id="41" dur="1" fill="hold">
+                                          <p:stCondLst>
+                                            <p:cond delay="0"/>
+                                          </p:stCondLst>
+                                        </p:cTn>
+                                        <p:tgtEl>
+                                          <p:spTgt spid="2">
+                                            <p:txEl>
+                                              <p:pRg st="4" end="4"/>
+                                            </p:txEl>
+                                          </p:spTgt>
+                                        </p:tgtEl>
+                                        <p:attrNameLst>
+                                          <p:attrName>style.visibility</p:attrName>
+                                        </p:attrNameLst>
+                                      </p:cBhvr>
+                                      <p:to>
+                                        <p:strVal val="visible"/>
+                                      </p:to>
+                                    </p:set>
+                                    <p:animEffect transition="in" filter="fade">
+                                      <p:cBhvr>
+                                        <p:cTn id="42" dur="1000"/>
+                                        <p:tgtEl>
+                                          <p:spTgt spid="2">
+                                            <p:txEl>
+                                              <p:pRg st="4" end="4"/>
+                                            </p:txEl>
+                                          </p:spTgt>
+                                        </p:tgtEl>
+                                      </p:cBhvr>
+                                    </p:animEffect>
+                                    <p:anim calcmode="lin" valueType="num">
+                                      <p:cBhvr>
+                                        <p:cTn id="43" dur="1000" fill="hold"/>
+                                        <p:tgtEl>
+                                          <p:spTgt spid="2">
+                                            <p:txEl>
+                                              <p:pRg st="4" end="4"/>
+                                            </p:txEl>
+                                          </p:spTgt>
+                                        </p:tgtEl>
+                                        <p:attrNameLst>
+                                          <p:attrName>ppt_x</p:attrName>
+                                        </p:attrNameLst>
+                                      </p:cBhvr>
+                                      <p:tavLst>
+                                        <p:tav tm="0">
+                                          <p:val>
+                                            <p:strVal val="#ppt_x"/>
+                                          </p:val>
+                                        </p:tav>
+                                        <p:tav tm="100000">
+                                          <p:val>
+                                            <p:strVal val="#ppt_x"/>
+                                          </p:val>
+                                        </p:tav>
+                                      </p:tavLst>
+                                    </p:anim>
+                                    <p:anim calcmode="lin" valueType="num">
+                                      <p:cBhvr>
+                                        <p:cTn id="44" dur="1000" fill="hold"/>
+                                        <p:tgtEl>
+                                          <p:spTgt spid="2">
+                                            <p:txEl>
+                                              <p:pRg st="4" end="4"/>
                                             </p:txEl>
                                           </p:spTgt>
                                         </p:tgtEl>

</xml_diff>